<commit_message>
modification des features + pptx
</commit_message>
<xml_diff>
--- a/cucumber.pptx
+++ b/cucumber.pptx
@@ -110,6 +110,11 @@
       </a:defRPr>
     </a:lvl9pPr>
   </p:defaultTextStyle>
+  <p:extLst>
+    <p:ext uri="{EFAFB233-063F-42B5-8137-9DF3F51BA10A}">
+      <p15:sldGuideLst xmlns:p15="http://schemas.microsoft.com/office/powerpoint/2012/main"/>
+    </p:ext>
+  </p:extLst>
 </p:presentation>
 </file>
 
@@ -836,7 +841,7 @@
             <a:fld id="{B61BEF0D-F0BB-DE4B-95CE-6DB70DBA9567}" type="datetimeFigureOut">
               <a:rPr lang="en-US" dirty="0"/>
               <a:pPr/>
-              <a:t>7/9/17</a:t>
+              <a:t>7/12/17</a:t>
             </a:fld>
             <a:endParaRPr lang="en-US" dirty="0"/>
           </a:p>
@@ -1084,7 +1089,7 @@
             <a:fld id="{B61BEF0D-F0BB-DE4B-95CE-6DB70DBA9567}" type="datetimeFigureOut">
               <a:rPr lang="en-US" dirty="0"/>
               <a:pPr/>
-              <a:t>7/9/17</a:t>
+              <a:t>7/12/17</a:t>
             </a:fld>
             <a:endParaRPr lang="en-US" dirty="0"/>
           </a:p>
@@ -1395,7 +1400,7 @@
             <a:fld id="{B61BEF0D-F0BB-DE4B-95CE-6DB70DBA9567}" type="datetimeFigureOut">
               <a:rPr lang="en-US" dirty="0"/>
               <a:pPr/>
-              <a:t>7/9/17</a:t>
+              <a:t>7/12/17</a:t>
             </a:fld>
             <a:endParaRPr lang="en-US" dirty="0"/>
           </a:p>
@@ -1733,7 +1738,7 @@
             <a:fld id="{B61BEF0D-F0BB-DE4B-95CE-6DB70DBA9567}" type="datetimeFigureOut">
               <a:rPr lang="en-US" dirty="0"/>
               <a:pPr/>
-              <a:t>7/9/17</a:t>
+              <a:t>7/12/17</a:t>
             </a:fld>
             <a:endParaRPr lang="en-US" dirty="0"/>
           </a:p>
@@ -2044,7 +2049,7 @@
             <a:fld id="{B61BEF0D-F0BB-DE4B-95CE-6DB70DBA9567}" type="datetimeFigureOut">
               <a:rPr lang="en-US" dirty="0"/>
               <a:pPr/>
-              <a:t>7/9/17</a:t>
+              <a:t>7/12/17</a:t>
             </a:fld>
             <a:endParaRPr lang="en-US" dirty="0"/>
           </a:p>
@@ -2434,7 +2439,7 @@
             <a:fld id="{B61BEF0D-F0BB-DE4B-95CE-6DB70DBA9567}" type="datetimeFigureOut">
               <a:rPr lang="en-US" dirty="0"/>
               <a:pPr/>
-              <a:t>7/9/17</a:t>
+              <a:t>7/12/17</a:t>
             </a:fld>
             <a:endParaRPr lang="en-US" dirty="0"/>
           </a:p>
@@ -2600,7 +2605,7 @@
           <a:p>
             <a:fld id="{55C6B4A9-1611-4792-9094-5F34BCA07E0B}" type="datetimeFigureOut">
               <a:rPr lang="en-US" dirty="0"/>
-              <a:t>7/9/17</a:t>
+              <a:t>7/12/17</a:t>
             </a:fld>
             <a:endParaRPr lang="en-US" dirty="0"/>
           </a:p>
@@ -2776,7 +2781,7 @@
             <a:fld id="{B61BEF0D-F0BB-DE4B-95CE-6DB70DBA9567}" type="datetimeFigureOut">
               <a:rPr lang="en-US" dirty="0"/>
               <a:pPr/>
-              <a:t>7/9/17</a:t>
+              <a:t>7/12/17</a:t>
             </a:fld>
             <a:endParaRPr lang="en-US" dirty="0"/>
           </a:p>
@@ -2949,7 +2954,7 @@
             <a:fld id="{B61BEF0D-F0BB-DE4B-95CE-6DB70DBA9567}" type="datetimeFigureOut">
               <a:rPr lang="en-US" dirty="0"/>
               <a:pPr/>
-              <a:t>7/9/17</a:t>
+              <a:t>7/12/17</a:t>
             </a:fld>
             <a:endParaRPr lang="en-US" dirty="0"/>
           </a:p>
@@ -3193,7 +3198,7 @@
             <a:fld id="{B61BEF0D-F0BB-DE4B-95CE-6DB70DBA9567}" type="datetimeFigureOut">
               <a:rPr lang="en-US" dirty="0"/>
               <a:pPr/>
-              <a:t>7/9/17</a:t>
+              <a:t>7/12/17</a:t>
             </a:fld>
             <a:endParaRPr lang="en-US" dirty="0"/>
           </a:p>
@@ -3421,7 +3426,7 @@
           <a:p>
             <a:fld id="{EB712588-04B1-427B-82EE-E8DB90309F08}" type="datetimeFigureOut">
               <a:rPr lang="en-US" dirty="0"/>
-              <a:t>7/9/17</a:t>
+              <a:t>7/12/17</a:t>
             </a:fld>
             <a:endParaRPr lang="en-US" dirty="0"/>
           </a:p>
@@ -3791,7 +3796,7 @@
             <a:fld id="{B61BEF0D-F0BB-DE4B-95CE-6DB70DBA9567}" type="datetimeFigureOut">
               <a:rPr lang="en-US" dirty="0"/>
               <a:pPr/>
-              <a:t>7/9/17</a:t>
+              <a:t>7/12/17</a:t>
             </a:fld>
             <a:endParaRPr lang="en-US" dirty="0"/>
           </a:p>
@@ -3911,7 +3916,7 @@
             <a:fld id="{B61BEF0D-F0BB-DE4B-95CE-6DB70DBA9567}" type="datetimeFigureOut">
               <a:rPr lang="en-US" dirty="0"/>
               <a:pPr/>
-              <a:t>7/9/17</a:t>
+              <a:t>7/12/17</a:t>
             </a:fld>
             <a:endParaRPr lang="en-US" dirty="0"/>
           </a:p>
@@ -4003,7 +4008,7 @@
             <a:fld id="{B61BEF0D-F0BB-DE4B-95CE-6DB70DBA9567}" type="datetimeFigureOut">
               <a:rPr lang="en-US" dirty="0"/>
               <a:pPr/>
-              <a:t>7/9/17</a:t>
+              <a:t>7/12/17</a:t>
             </a:fld>
             <a:endParaRPr lang="en-US" dirty="0"/>
           </a:p>
@@ -4254,7 +4259,7 @@
           <a:p>
             <a:fld id="{42A54C80-263E-416B-A8E0-580EDEADCBDC}" type="datetimeFigureOut">
               <a:rPr lang="en-US" dirty="0"/>
-              <a:t>7/9/17</a:t>
+              <a:t>7/12/17</a:t>
             </a:fld>
             <a:endParaRPr lang="en-US" dirty="0"/>
           </a:p>
@@ -4513,7 +4518,7 @@
             <a:fld id="{B61BEF0D-F0BB-DE4B-95CE-6DB70DBA9567}" type="datetimeFigureOut">
               <a:rPr lang="en-US" dirty="0"/>
               <a:pPr/>
-              <a:t>7/9/17</a:t>
+              <a:t>7/12/17</a:t>
             </a:fld>
             <a:endParaRPr lang="en-US" dirty="0"/>
           </a:p>
@@ -5253,7 +5258,7 @@
             <a:fld id="{B61BEF0D-F0BB-DE4B-95CE-6DB70DBA9567}" type="datetimeFigureOut">
               <a:rPr lang="en-US" dirty="0"/>
               <a:pPr/>
-              <a:t>7/9/17</a:t>
+              <a:t>7/12/17</a:t>
             </a:fld>
             <a:endParaRPr lang="en-US" dirty="0"/>
           </a:p>
@@ -5893,8 +5898,9 @@
           <a:p>
             <a:r>
               <a:rPr lang="fr-FR" dirty="0" smtClean="0"/>
-              <a:t>Framework de tests</a:t>
-            </a:r>
+              <a:t>Outils de spécifications </a:t>
+            </a:r>
+            <a:endParaRPr lang="fr-FR" dirty="0" smtClean="0"/>
           </a:p>
           <a:p>
             <a:endParaRPr lang="fr-FR" dirty="0" smtClean="0"/>

</xml_diff>